<commit_message>
Added some more information.
</commit_message>
<xml_diff>
--- a/test_details.pptx
+++ b/test_details.pptx
@@ -4516,7 +4516,11 @@
           <a:p>
             <a:r>
               <a:rPr lang="en-GB" dirty="0" smtClean="0"/>
-              <a:t>December 8</a:t>
+              <a:t>Test Dates: December </a:t>
+            </a:r>
+            <a:r>
+              <a:rPr lang="en-GB" dirty="0" smtClean="0"/>
+              <a:t>8</a:t>
             </a:r>
             <a:r>
               <a:rPr lang="en-GB" baseline="30000" dirty="0" smtClean="0"/>
@@ -4578,8 +4582,8 @@
         </p:nvSpPr>
         <p:spPr>
           <a:xfrm>
-            <a:off x="112295" y="1238383"/>
-            <a:ext cx="1417220" cy="4801314"/>
+            <a:off x="0" y="1238383"/>
+            <a:ext cx="1529515" cy="4801314"/>
           </a:xfrm>
           <a:prstGeom prst="rect">
             <a:avLst/>
@@ -4594,8 +4598,15 @@
           <a:p>
             <a:r>
               <a:rPr lang="en-GB" dirty="0" smtClean="0"/>
-              <a:t>Ionosonde:</a:t>
-            </a:r>
+              <a:t>Assimilated</a:t>
+            </a:r>
+          </a:p>
+          <a:p>
+            <a:r>
+              <a:rPr lang="en-GB" dirty="0" smtClean="0"/>
+              <a:t>Ionosondes:</a:t>
+            </a:r>
+            <a:endParaRPr lang="en-GB" dirty="0" smtClean="0"/>
           </a:p>
           <a:p>
             <a:endParaRPr lang="en-GB" dirty="0"/>
@@ -4642,10 +4653,19 @@
             <a:endParaRPr lang="en-GB" dirty="0" smtClean="0"/>
           </a:p>
           <a:p>
-            <a:endParaRPr lang="en-GB" dirty="0"/>
-          </a:p>
-          <a:p>
-            <a:endParaRPr lang="en-GB" dirty="0"/>
+            <a:r>
+              <a:rPr lang="en-GB" dirty="0" smtClean="0">
+                <a:solidFill>
+                  <a:srgbClr val="FF0000"/>
+                </a:solidFill>
+              </a:rPr>
+              <a:t>Test station:</a:t>
+            </a:r>
+            <a:endParaRPr lang="en-GB" dirty="0">
+              <a:solidFill>
+                <a:srgbClr val="FF0000"/>
+              </a:solidFill>
+            </a:endParaRPr>
           </a:p>
           <a:p>
             <a:r>
@@ -4681,7 +4701,7 @@
         <p:spPr>
           <a:xfrm>
             <a:off x="7481135" y="1238383"/>
-            <a:ext cx="1417220" cy="4801314"/>
+            <a:ext cx="1417220" cy="5078313"/>
           </a:xfrm>
           <a:prstGeom prst="rect">
             <a:avLst/>
@@ -4696,7 +4716,17 @@
           <a:p>
             <a:r>
               <a:rPr lang="en-GB" dirty="0" smtClean="0"/>
-              <a:t>GPS:</a:t>
+              <a:t>Assimilated</a:t>
+            </a:r>
+          </a:p>
+          <a:p>
+            <a:r>
+              <a:rPr lang="en-GB" dirty="0" smtClean="0"/>
+              <a:t>GNSS</a:t>
+            </a:r>
+            <a:r>
+              <a:rPr lang="en-GB" dirty="0" smtClean="0"/>
+              <a:t>:</a:t>
             </a:r>
           </a:p>
           <a:p>
@@ -4778,7 +4808,19 @@
             <a:endParaRPr lang="en-GB" dirty="0" smtClean="0"/>
           </a:p>
           <a:p>
-            <a:endParaRPr lang="en-GB" dirty="0"/>
+            <a:r>
+              <a:rPr lang="en-GB" dirty="0" smtClean="0">
+                <a:solidFill>
+                  <a:srgbClr val="FF0000"/>
+                </a:solidFill>
+              </a:rPr>
+              <a:t>Test station:</a:t>
+            </a:r>
+            <a:endParaRPr lang="en-GB" dirty="0">
+              <a:solidFill>
+                <a:srgbClr val="FF0000"/>
+              </a:solidFill>
+            </a:endParaRPr>
           </a:p>
           <a:p>
             <a:r>
@@ -4832,166 +4874,6 @@
           <a:chExt cx="0" cy="0"/>
         </a:xfrm>
       </p:grpSpPr>
-      <p:sp>
-        <p:nvSpPr>
-          <p:cNvPr id="2" name="Title 1"/>
-          <p:cNvSpPr>
-            <a:spLocks noGrp="1"/>
-          </p:cNvSpPr>
-          <p:nvPr>
-            <p:ph type="title"/>
-          </p:nvPr>
-        </p:nvSpPr>
-        <p:spPr/>
-        <p:txBody>
-          <a:bodyPr/>
-          <a:lstStyle/>
-          <a:p>
-            <a:r>
-              <a:rPr lang="en-GB" dirty="0" smtClean="0"/>
-              <a:t>December 8</a:t>
-            </a:r>
-            <a:r>
-              <a:rPr lang="en-GB" baseline="30000" dirty="0" smtClean="0"/>
-              <a:t>th</a:t>
-            </a:r>
-            <a:r>
-              <a:rPr lang="en-GB" dirty="0"/>
-              <a:t> </a:t>
-            </a:r>
-            <a:r>
-              <a:rPr lang="en-GB" dirty="0" smtClean="0"/>
-              <a:t>2008 – January 7</a:t>
-            </a:r>
-            <a:r>
-              <a:rPr lang="en-GB" baseline="30000" dirty="0" smtClean="0"/>
-              <a:t>th</a:t>
-            </a:r>
-            <a:r>
-              <a:rPr lang="en-GB" dirty="0" smtClean="0"/>
-              <a:t> 2009</a:t>
-            </a:r>
-            <a:endParaRPr lang="en-GB" dirty="0"/>
-          </a:p>
-        </p:txBody>
-      </p:sp>
-      <p:sp>
-        <p:nvSpPr>
-          <p:cNvPr id="7" name="TextBox 6"/>
-          <p:cNvSpPr txBox="1"/>
-          <p:nvPr/>
-        </p:nvSpPr>
-        <p:spPr>
-          <a:xfrm>
-            <a:off x="7481135" y="1238383"/>
-            <a:ext cx="1417220" cy="4524315"/>
-          </a:xfrm>
-          <a:prstGeom prst="rect">
-            <a:avLst/>
-          </a:prstGeom>
-          <a:noFill/>
-        </p:spPr>
-        <p:txBody>
-          <a:bodyPr wrap="square" rtlCol="0">
-            <a:spAutoFit/>
-          </a:bodyPr>
-          <a:lstStyle/>
-          <a:p>
-            <a:r>
-              <a:rPr lang="en-GB" dirty="0" smtClean="0"/>
-              <a:t>GPS:</a:t>
-            </a:r>
-          </a:p>
-          <a:p>
-            <a:endParaRPr lang="en-GB" dirty="0"/>
-          </a:p>
-          <a:p>
-            <a:r>
-              <a:rPr lang="en-GB" dirty="0" smtClean="0"/>
-              <a:t>BOR1</a:t>
-            </a:r>
-          </a:p>
-          <a:p>
-            <a:r>
-              <a:rPr lang="en-GB" dirty="0" smtClean="0"/>
-              <a:t>BRUS</a:t>
-            </a:r>
-          </a:p>
-          <a:p>
-            <a:r>
-              <a:rPr lang="en-GB" dirty="0" smtClean="0"/>
-              <a:t>GOPE</a:t>
-            </a:r>
-          </a:p>
-          <a:p>
-            <a:r>
-              <a:rPr lang="en-GB" dirty="0" smtClean="0"/>
-              <a:t>HELG</a:t>
-            </a:r>
-          </a:p>
-          <a:p>
-            <a:r>
-              <a:rPr lang="en-GB" dirty="0" smtClean="0"/>
-              <a:t>HERT</a:t>
-            </a:r>
-          </a:p>
-          <a:p>
-            <a:r>
-              <a:rPr lang="en-GB" dirty="0" smtClean="0"/>
-              <a:t>OBEC</a:t>
-            </a:r>
-          </a:p>
-          <a:p>
-            <a:r>
-              <a:rPr lang="en-GB" dirty="0" smtClean="0"/>
-              <a:t>OPMT</a:t>
-            </a:r>
-          </a:p>
-          <a:p>
-            <a:r>
-              <a:rPr lang="en-GB" dirty="0" smtClean="0"/>
-              <a:t>POTS</a:t>
-            </a:r>
-          </a:p>
-          <a:p>
-            <a:r>
-              <a:rPr lang="en-GB" dirty="0" smtClean="0"/>
-              <a:t>PTBB</a:t>
-            </a:r>
-          </a:p>
-          <a:p>
-            <a:r>
-              <a:rPr lang="en-GB" dirty="0" smtClean="0"/>
-              <a:t>WROC</a:t>
-            </a:r>
-          </a:p>
-          <a:p>
-            <a:r>
-              <a:rPr lang="en-GB" dirty="0" smtClean="0"/>
-              <a:t>WSRT</a:t>
-            </a:r>
-          </a:p>
-          <a:p>
-            <a:r>
-              <a:rPr lang="en-GB" dirty="0" smtClean="0"/>
-              <a:t>ZIMM</a:t>
-            </a:r>
-          </a:p>
-          <a:p>
-            <a:endParaRPr lang="en-GB" dirty="0"/>
-          </a:p>
-          <a:p>
-            <a:r>
-              <a:rPr lang="en-GB" dirty="0" smtClean="0">
-                <a:solidFill>
-                  <a:srgbClr val="FF0000"/>
-                </a:solidFill>
-              </a:rPr>
-              <a:t>REDU</a:t>
-            </a:r>
-          </a:p>
-        </p:txBody>
-      </p:sp>
       <p:pic>
         <p:nvPicPr>
           <p:cNvPr id="10" name="Content Placeholder 7"/>
@@ -5031,14 +4913,14 @@
       </p:pic>
       <p:sp>
         <p:nvSpPr>
-          <p:cNvPr id="8" name="TextBox 7"/>
+          <p:cNvPr id="6" name="TextBox 5"/>
           <p:cNvSpPr txBox="1"/>
           <p:nvPr/>
         </p:nvSpPr>
         <p:spPr>
           <a:xfrm>
-            <a:off x="112295" y="1238383"/>
-            <a:ext cx="1417220" cy="4801314"/>
+            <a:off x="0" y="1238383"/>
+            <a:ext cx="1529515" cy="4801314"/>
           </a:xfrm>
           <a:prstGeom prst="rect">
             <a:avLst/>
@@ -5053,8 +4935,15 @@
           <a:p>
             <a:r>
               <a:rPr lang="en-GB" dirty="0" smtClean="0"/>
-              <a:t>Ionosonde:</a:t>
-            </a:r>
+              <a:t>Assimilated</a:t>
+            </a:r>
+          </a:p>
+          <a:p>
+            <a:r>
+              <a:rPr lang="en-GB" dirty="0" smtClean="0"/>
+              <a:t>Ionosondes:</a:t>
+            </a:r>
+            <a:endParaRPr lang="en-GB" dirty="0" smtClean="0"/>
           </a:p>
           <a:p>
             <a:endParaRPr lang="en-GB" dirty="0"/>
@@ -5101,10 +4990,19 @@
             <a:endParaRPr lang="en-GB" dirty="0" smtClean="0"/>
           </a:p>
           <a:p>
-            <a:endParaRPr lang="en-GB" dirty="0"/>
-          </a:p>
-          <a:p>
-            <a:endParaRPr lang="en-GB" dirty="0"/>
+            <a:r>
+              <a:rPr lang="en-GB" dirty="0" smtClean="0">
+                <a:solidFill>
+                  <a:srgbClr val="FF0000"/>
+                </a:solidFill>
+              </a:rPr>
+              <a:t>Test station:</a:t>
+            </a:r>
+            <a:endParaRPr lang="en-GB" dirty="0">
+              <a:solidFill>
+                <a:srgbClr val="FF0000"/>
+              </a:solidFill>
+            </a:endParaRPr>
           </a:p>
           <a:p>
             <a:r>
@@ -5128,6 +5026,186 @@
                 <a:srgbClr val="FF0000"/>
               </a:solidFill>
             </a:endParaRPr>
+          </a:p>
+        </p:txBody>
+      </p:sp>
+      <p:sp>
+        <p:nvSpPr>
+          <p:cNvPr id="9" name="TextBox 8"/>
+          <p:cNvSpPr txBox="1"/>
+          <p:nvPr/>
+        </p:nvSpPr>
+        <p:spPr>
+          <a:xfrm>
+            <a:off x="7481135" y="1238383"/>
+            <a:ext cx="1417220" cy="5078313"/>
+          </a:xfrm>
+          <a:prstGeom prst="rect">
+            <a:avLst/>
+          </a:prstGeom>
+          <a:noFill/>
+        </p:spPr>
+        <p:txBody>
+          <a:bodyPr wrap="square" rtlCol="0">
+            <a:spAutoFit/>
+          </a:bodyPr>
+          <a:lstStyle/>
+          <a:p>
+            <a:r>
+              <a:rPr lang="en-GB" dirty="0" smtClean="0"/>
+              <a:t>Assimilated</a:t>
+            </a:r>
+          </a:p>
+          <a:p>
+            <a:r>
+              <a:rPr lang="en-GB" dirty="0" smtClean="0"/>
+              <a:t>GNSS</a:t>
+            </a:r>
+            <a:r>
+              <a:rPr lang="en-GB" dirty="0" smtClean="0"/>
+              <a:t>:</a:t>
+            </a:r>
+          </a:p>
+          <a:p>
+            <a:endParaRPr lang="en-GB" dirty="0"/>
+          </a:p>
+          <a:p>
+            <a:r>
+              <a:rPr lang="en-GB" dirty="0" smtClean="0"/>
+              <a:t>BOR1</a:t>
+            </a:r>
+          </a:p>
+          <a:p>
+            <a:r>
+              <a:rPr lang="en-GB" dirty="0" smtClean="0"/>
+              <a:t>BRUS</a:t>
+            </a:r>
+          </a:p>
+          <a:p>
+            <a:r>
+              <a:rPr lang="en-GB" dirty="0" smtClean="0"/>
+              <a:t>GOPE</a:t>
+            </a:r>
+          </a:p>
+          <a:p>
+            <a:r>
+              <a:rPr lang="en-GB" dirty="0" smtClean="0"/>
+              <a:t>HELG</a:t>
+            </a:r>
+          </a:p>
+          <a:p>
+            <a:r>
+              <a:rPr lang="en-GB" dirty="0" smtClean="0"/>
+              <a:t>HERT</a:t>
+            </a:r>
+          </a:p>
+          <a:p>
+            <a:r>
+              <a:rPr lang="en-GB" dirty="0" smtClean="0"/>
+              <a:t>OBEC</a:t>
+            </a:r>
+          </a:p>
+          <a:p>
+            <a:r>
+              <a:rPr lang="en-GB" dirty="0" smtClean="0"/>
+              <a:t>OPMT</a:t>
+            </a:r>
+          </a:p>
+          <a:p>
+            <a:r>
+              <a:rPr lang="en-GB" dirty="0" smtClean="0"/>
+              <a:t>POTS</a:t>
+            </a:r>
+          </a:p>
+          <a:p>
+            <a:r>
+              <a:rPr lang="en-GB" dirty="0" smtClean="0"/>
+              <a:t>PTBB</a:t>
+            </a:r>
+          </a:p>
+          <a:p>
+            <a:r>
+              <a:rPr lang="en-GB" dirty="0" smtClean="0"/>
+              <a:t>WROC</a:t>
+            </a:r>
+          </a:p>
+          <a:p>
+            <a:r>
+              <a:rPr lang="en-GB" dirty="0" smtClean="0"/>
+              <a:t>WSRT</a:t>
+            </a:r>
+          </a:p>
+          <a:p>
+            <a:r>
+              <a:rPr lang="en-GB" dirty="0" smtClean="0"/>
+              <a:t>ZIMM</a:t>
+            </a:r>
+          </a:p>
+          <a:p>
+            <a:endParaRPr lang="en-GB" dirty="0" smtClean="0"/>
+          </a:p>
+          <a:p>
+            <a:r>
+              <a:rPr lang="en-GB" dirty="0" smtClean="0">
+                <a:solidFill>
+                  <a:srgbClr val="FF0000"/>
+                </a:solidFill>
+              </a:rPr>
+              <a:t>Test station:</a:t>
+            </a:r>
+            <a:endParaRPr lang="en-GB" dirty="0">
+              <a:solidFill>
+                <a:srgbClr val="FF0000"/>
+              </a:solidFill>
+            </a:endParaRPr>
+          </a:p>
+          <a:p>
+            <a:r>
+              <a:rPr lang="en-GB" dirty="0" smtClean="0">
+                <a:solidFill>
+                  <a:srgbClr val="FF0000"/>
+                </a:solidFill>
+              </a:rPr>
+              <a:t>REDU</a:t>
+            </a:r>
+          </a:p>
+        </p:txBody>
+      </p:sp>
+      <p:sp>
+        <p:nvSpPr>
+          <p:cNvPr id="3" name="Title 2"/>
+          <p:cNvSpPr>
+            <a:spLocks noGrp="1"/>
+          </p:cNvSpPr>
+          <p:nvPr>
+            <p:ph type="title"/>
+          </p:nvPr>
+        </p:nvSpPr>
+        <p:spPr/>
+        <p:txBody>
+          <a:bodyPr/>
+          <a:lstStyle/>
+          <a:p>
+            <a:r>
+              <a:rPr lang="en-GB" dirty="0"/>
+              <a:t>Test Dates: December 8</a:t>
+            </a:r>
+            <a:r>
+              <a:rPr lang="en-GB" baseline="30000" dirty="0"/>
+              <a:t>th</a:t>
+            </a:r>
+            <a:r>
+              <a:rPr lang="en-GB" dirty="0"/>
+              <a:t> 2008 – January 7</a:t>
+            </a:r>
+            <a:r>
+              <a:rPr lang="en-GB" baseline="30000" dirty="0"/>
+              <a:t>th</a:t>
+            </a:r>
+            <a:r>
+              <a:rPr lang="en-GB" dirty="0"/>
+              <a:t> 2009</a:t>
+            </a:r>
           </a:p>
         </p:txBody>
       </p:sp>

</xml_diff>

<commit_message>
Updated info about dSTEC.
</commit_message>
<xml_diff>
--- a/test_details.pptx
+++ b/test_details.pptx
@@ -4516,11 +4516,7 @@
           <a:p>
             <a:r>
               <a:rPr lang="en-GB" dirty="0" smtClean="0"/>
-              <a:t>Test Dates: December </a:t>
-            </a:r>
-            <a:r>
-              <a:rPr lang="en-GB" dirty="0" smtClean="0"/>
-              <a:t>8</a:t>
+              <a:t>Test Dates: December 8</a:t>
             </a:r>
             <a:r>
               <a:rPr lang="en-GB" baseline="30000" dirty="0" smtClean="0"/>
@@ -4606,7 +4602,6 @@
               <a:rPr lang="en-GB" dirty="0" smtClean="0"/>
               <a:t>Ionosondes:</a:t>
             </a:r>
-            <a:endParaRPr lang="en-GB" dirty="0" smtClean="0"/>
           </a:p>
           <a:p>
             <a:endParaRPr lang="en-GB" dirty="0"/>
@@ -4722,11 +4717,7 @@
           <a:p>
             <a:r>
               <a:rPr lang="en-GB" dirty="0" smtClean="0"/>
-              <a:t>GNSS</a:t>
-            </a:r>
-            <a:r>
-              <a:rPr lang="en-GB" dirty="0" smtClean="0"/>
-              <a:t>:</a:t>
+              <a:t>GNSS:</a:t>
             </a:r>
           </a:p>
           <a:p>
@@ -4943,7 +4934,6 @@
               <a:rPr lang="en-GB" dirty="0" smtClean="0"/>
               <a:t>Ionosondes:</a:t>
             </a:r>
-            <a:endParaRPr lang="en-GB" dirty="0" smtClean="0"/>
           </a:p>
           <a:p>
             <a:endParaRPr lang="en-GB" dirty="0"/>
@@ -5059,11 +5049,7 @@
           <a:p>
             <a:r>
               <a:rPr lang="en-GB" dirty="0" smtClean="0"/>
-              <a:t>GNSS</a:t>
-            </a:r>
-            <a:r>
-              <a:rPr lang="en-GB" dirty="0" smtClean="0"/>
-              <a:t>:</a:t>
+              <a:t>GNSS:</a:t>
             </a:r>
           </a:p>
           <a:p>
@@ -5331,6 +5317,38 @@
               <a:rPr lang="en-GB" dirty="0" smtClean="0"/>
               <a:t>).</a:t>
             </a:r>
+          </a:p>
+          <a:p>
+            <a:pPr marL="285750" indent="-285750">
+              <a:buClr>
+                <a:srgbClr val="B40067"/>
+              </a:buClr>
+              <a:buFont typeface="Arial" panose="020B0604020202020204" pitchFamily="34" charset="0"/>
+              <a:buChar char="•"/>
+            </a:pPr>
+            <a:r>
+              <a:rPr lang="en-GB" dirty="0" err="1" smtClean="0"/>
+              <a:t>dSTEC</a:t>
+            </a:r>
+            <a:r>
+              <a:rPr lang="en-GB" dirty="0" smtClean="0"/>
+              <a:t> data should be downloaded from</a:t>
+            </a:r>
+            <a:r>
+              <a:rPr lang="en-GB" smtClean="0"/>
+              <a:t>: </a:t>
+            </a:r>
+            <a:r>
+              <a:rPr lang="en-GB" smtClean="0">
+                <a:hlinkClick r:id="rId4"/>
+              </a:rPr>
+              <a:t>http://tinyurl.com/testscenario</a:t>
+            </a:r>
+            <a:r>
+              <a:rPr lang="en-GB" smtClean="0"/>
+              <a:t> </a:t>
+            </a:r>
+            <a:endParaRPr lang="en-GB" dirty="0" smtClean="0"/>
           </a:p>
           <a:p>
             <a:pPr marL="285750" indent="-285750">

</xml_diff>